<commit_message>
Bootstrap grids - further info
</commit_message>
<xml_diff>
--- a/ppt/Basweb02-05-03-grids-empty.pptx
+++ b/ppt/Basweb02-05-03-grids-empty.pptx
@@ -7,7 +7,12 @@
   <p:sldIdLst>
     <p:sldId id="256" r:id="rId2"/>
     <p:sldId id="260" r:id="rId3"/>
-    <p:sldId id="258" r:id="rId4"/>
+    <p:sldId id="261" r:id="rId4"/>
+    <p:sldId id="262" r:id="rId5"/>
+    <p:sldId id="263" r:id="rId6"/>
+    <p:sldId id="264" r:id="rId7"/>
+    <p:sldId id="266" r:id="rId8"/>
+    <p:sldId id="267" r:id="rId9"/>
   </p:sldIdLst>
   <p:sldSz cx="9144000" cy="6858000" type="screen4x3"/>
   <p:notesSz cx="6858000" cy="9144000"/>
@@ -3114,11 +3119,7 @@
           <a:p>
             <a:r>
               <a:rPr lang="en-US" dirty="0" smtClean="0"/>
-              <a:t>Class 5 – </a:t>
-            </a:r>
-            <a:r>
-              <a:rPr lang="en-US" dirty="0" smtClean="0"/>
-              <a:t>Grids</a:t>
+              <a:t>Class 5 – Grids</a:t>
             </a:r>
             <a:endParaRPr lang="en-US" dirty="0"/>
           </a:p>
@@ -3153,6 +3154,13 @@
   <p:clrMapOvr>
     <a:masterClrMapping/>
   </p:clrMapOvr>
+  <p:timing>
+    <p:tnLst>
+      <p:par>
+        <p:cTn xmlns:p14="http://schemas.microsoft.com/office/powerpoint/2010/main" id="1" dur="indefinite" restart="never" nodeType="tmRoot"/>
+      </p:par>
+    </p:tnLst>
+  </p:timing>
 </p:sld>
 </file>
 
@@ -3198,7 +3206,19 @@
                 <a:ea typeface="+mj-ea"/>
                 <a:cs typeface="+mj-cs"/>
               </a:rPr>
-              <a:t>Grids</a:t>
+              <a:t>Bootstrap</a:t>
+            </a:r>
+            <a:r>
+              <a:rPr lang="en-US" sz="4400" kern="1200" baseline="0" dirty="0" smtClean="0">
+                <a:solidFill>
+                  <a:schemeClr val="tx1"/>
+                </a:solidFill>
+                <a:effectLst/>
+                <a:latin typeface="+mj-lt"/>
+                <a:ea typeface="+mj-ea"/>
+                <a:cs typeface="+mj-cs"/>
+              </a:rPr>
+              <a:t> Grids</a:t>
             </a:r>
             <a:endParaRPr lang="en-US" dirty="0"/>
           </a:p>
@@ -3216,10 +3236,82 @@
         </p:nvSpPr>
         <p:spPr/>
         <p:txBody>
-          <a:bodyPr/>
-          <a:lstStyle/>
-          <a:p>
-            <a:endParaRPr lang="en-US"/>
+          <a:bodyPr>
+            <a:normAutofit/>
+          </a:bodyPr>
+          <a:lstStyle/>
+          <a:p>
+            <a:r>
+              <a:rPr lang="en-US" dirty="0" err="1" smtClean="0"/>
+              <a:t>Reponsive</a:t>
+            </a:r>
+            <a:endParaRPr lang="en-US" dirty="0" smtClean="0"/>
+          </a:p>
+          <a:p>
+            <a:r>
+              <a:rPr lang="en-US" dirty="0" smtClean="0"/>
+              <a:t>Mobile-first</a:t>
+            </a:r>
+          </a:p>
+          <a:p>
+            <a:r>
+              <a:rPr lang="en-US" dirty="0" smtClean="0"/>
+              <a:t>HTML</a:t>
+            </a:r>
+            <a:r>
+              <a:rPr lang="en-US" baseline="0" dirty="0" smtClean="0"/>
+              <a:t> changes, CSS stays the same</a:t>
+            </a:r>
+          </a:p>
+          <a:p>
+            <a:r>
+              <a:rPr lang="en-US" baseline="0" dirty="0" smtClean="0"/>
+              <a:t>Four sizes:</a:t>
+            </a:r>
+          </a:p>
+          <a:p>
+            <a:pPr lvl="1"/>
+            <a:r>
+              <a:rPr lang="en-US" dirty="0" err="1" smtClean="0"/>
+              <a:t>xs</a:t>
+            </a:r>
+            <a:r>
+              <a:rPr lang="en-US" dirty="0" smtClean="0"/>
+              <a:t> (Extra</a:t>
+            </a:r>
+            <a:r>
+              <a:rPr lang="en-US" baseline="0" dirty="0" smtClean="0"/>
+              <a:t> Small)</a:t>
+            </a:r>
+          </a:p>
+          <a:p>
+            <a:pPr lvl="1"/>
+            <a:r>
+              <a:rPr lang="en-US" baseline="0" dirty="0" err="1" smtClean="0"/>
+              <a:t>sm</a:t>
+            </a:r>
+            <a:r>
+              <a:rPr lang="en-US" baseline="0" dirty="0" smtClean="0"/>
+              <a:t> (Small)</a:t>
+            </a:r>
+          </a:p>
+          <a:p>
+            <a:pPr lvl="1"/>
+            <a:r>
+              <a:rPr lang="en-US" baseline="0" dirty="0" smtClean="0"/>
+              <a:t>md (Medium)</a:t>
+            </a:r>
+          </a:p>
+          <a:p>
+            <a:pPr lvl="1"/>
+            <a:r>
+              <a:rPr lang="en-US" baseline="0" dirty="0" err="1" smtClean="0"/>
+              <a:t>lg</a:t>
+            </a:r>
+            <a:r>
+              <a:rPr lang="en-US" baseline="0" dirty="0" smtClean="0"/>
+              <a:t> (Large)</a:t>
+            </a:r>
           </a:p>
         </p:txBody>
       </p:sp>
@@ -3233,6 +3325,13 @@
   <p:clrMapOvr>
     <a:masterClrMapping/>
   </p:clrMapOvr>
+  <p:timing>
+    <p:tnLst>
+      <p:par>
+        <p:cTn xmlns:p14="http://schemas.microsoft.com/office/powerpoint/2010/main" id="1" dur="indefinite" restart="never" nodeType="tmRoot"/>
+      </p:par>
+    </p:tnLst>
+  </p:timing>
 </p:sld>
 </file>
 
@@ -3268,6 +3367,11 @@
           <a:bodyPr/>
           <a:lstStyle/>
           <a:p>
+            <a:pPr lvl="0"/>
+            <a:r>
+              <a:rPr lang="en-US" dirty="0" smtClean="0"/>
+              <a:t>Extra-small (Phones)</a:t>
+            </a:r>
             <a:endParaRPr lang="en-US" dirty="0"/>
           </a:p>
         </p:txBody>
@@ -3282,19 +3386,1196 @@
             <p:ph idx="1"/>
           </p:nvPr>
         </p:nvSpPr>
-        <p:spPr/>
-        <p:txBody>
-          <a:bodyPr/>
-          <a:lstStyle/>
-          <a:p>
-            <a:endParaRPr lang="en-US"/>
-          </a:p>
-        </p:txBody>
-      </p:sp>
+        <p:spPr>
+          <a:xfrm>
+            <a:off x="457200" y="1600200"/>
+            <a:ext cx="3525472" cy="4525963"/>
+          </a:xfrm>
+        </p:spPr>
+        <p:txBody>
+          <a:bodyPr>
+            <a:normAutofit fontScale="77500" lnSpcReduction="20000"/>
+          </a:bodyPr>
+          <a:lstStyle/>
+          <a:p>
+            <a:pPr marL="0" indent="0">
+              <a:buNone/>
+            </a:pPr>
+            <a:r>
+              <a:rPr lang="en-US" dirty="0"/>
+              <a:t>&lt;div class="col-xs-12"&gt;</a:t>
+            </a:r>
+          </a:p>
+          <a:p>
+            <a:pPr marL="0" indent="0">
+              <a:buNone/>
+            </a:pPr>
+            <a:r>
+              <a:rPr lang="en-US" dirty="0"/>
+              <a:t> ...</a:t>
+            </a:r>
+          </a:p>
+          <a:p>
+            <a:pPr marL="0" indent="0">
+              <a:buNone/>
+            </a:pPr>
+            <a:r>
+              <a:rPr lang="en-US" dirty="0"/>
+              <a:t>&lt;/div&gt;</a:t>
+            </a:r>
+          </a:p>
+          <a:p>
+            <a:pPr marL="0" indent="0">
+              <a:buNone/>
+            </a:pPr>
+            <a:endParaRPr lang="en-US" dirty="0"/>
+          </a:p>
+          <a:p>
+            <a:pPr marL="0" indent="0">
+              <a:buNone/>
+            </a:pPr>
+            <a:r>
+              <a:rPr lang="en-US" dirty="0"/>
+              <a:t>&lt;div class="col-xs-12"&gt;</a:t>
+            </a:r>
+          </a:p>
+          <a:p>
+            <a:pPr marL="0" indent="0">
+              <a:buNone/>
+            </a:pPr>
+            <a:r>
+              <a:rPr lang="en-US" dirty="0"/>
+              <a:t> ...</a:t>
+            </a:r>
+          </a:p>
+          <a:p>
+            <a:pPr marL="0" indent="0">
+              <a:buNone/>
+            </a:pPr>
+            <a:r>
+              <a:rPr lang="en-US" dirty="0"/>
+              <a:t>&lt;/div&gt;</a:t>
+            </a:r>
+          </a:p>
+          <a:p>
+            <a:pPr marL="0" indent="0">
+              <a:buNone/>
+            </a:pPr>
+            <a:endParaRPr lang="en-US" dirty="0"/>
+          </a:p>
+          <a:p>
+            <a:pPr marL="0" indent="0">
+              <a:buNone/>
+            </a:pPr>
+            <a:r>
+              <a:rPr lang="en-US" dirty="0"/>
+              <a:t>&lt;div class=</a:t>
+            </a:r>
+            <a:r>
+              <a:rPr lang="en-US" dirty="0" smtClean="0"/>
+              <a:t>"col</a:t>
+            </a:r>
+            <a:r>
+              <a:rPr lang="en-US" dirty="0"/>
+              <a:t>-xs-12"&gt;</a:t>
+            </a:r>
+          </a:p>
+          <a:p>
+            <a:pPr marL="0" indent="0">
+              <a:buNone/>
+            </a:pPr>
+            <a:r>
+              <a:rPr lang="en-US" dirty="0"/>
+              <a:t> ...</a:t>
+            </a:r>
+          </a:p>
+          <a:p>
+            <a:pPr marL="0" indent="0">
+              <a:buNone/>
+            </a:pPr>
+            <a:r>
+              <a:rPr lang="en-US" dirty="0"/>
+              <a:t>&lt;/div&gt;</a:t>
+            </a:r>
+          </a:p>
+        </p:txBody>
+      </p:sp>
+      <p:pic>
+        <p:nvPicPr>
+          <p:cNvPr id="4" name="Picture 3" descr="Screen Shot 2015-05-03 at 10.18.09 PM.png"/>
+          <p:cNvPicPr>
+            <a:picLocks noChangeAspect="1"/>
+          </p:cNvPicPr>
+          <p:nvPr/>
+        </p:nvPicPr>
+        <p:blipFill>
+          <a:blip r:embed="rId2">
+            <a:extLst>
+              <a:ext uri="{28A0092B-C50C-407E-A947-70E740481C1C}">
+                <a14:useLocalDpi xmlns:a14="http://schemas.microsoft.com/office/drawing/2010/main" val="0"/>
+              </a:ext>
+            </a:extLst>
+          </a:blip>
+          <a:stretch>
+            <a:fillRect/>
+          </a:stretch>
+        </p:blipFill>
+        <p:spPr>
+          <a:xfrm>
+            <a:off x="5081002" y="1600200"/>
+            <a:ext cx="3153710" cy="4996587"/>
+          </a:xfrm>
+          <a:prstGeom prst="rect">
+            <a:avLst/>
+          </a:prstGeom>
+        </p:spPr>
+      </p:pic>
     </p:spTree>
     <p:extLst>
       <p:ext uri="{BB962C8B-B14F-4D97-AF65-F5344CB8AC3E}">
-        <p14:creationId xmlns:p14="http://schemas.microsoft.com/office/powerpoint/2010/main" val="927500659"/>
+        <p14:creationId xmlns:p14="http://schemas.microsoft.com/office/powerpoint/2010/main" val="3926170679"/>
+      </p:ext>
+    </p:extLst>
+  </p:cSld>
+  <p:clrMapOvr>
+    <a:masterClrMapping/>
+  </p:clrMapOvr>
+  <p:timing>
+    <p:tnLst>
+      <p:par>
+        <p:cTn xmlns:p14="http://schemas.microsoft.com/office/powerpoint/2010/main" id="1" dur="indefinite" restart="never" nodeType="tmRoot"/>
+      </p:par>
+    </p:tnLst>
+  </p:timing>
+</p:sld>
+</file>
+
+<file path=ppt/slides/slide4.xml><?xml version="1.0" encoding="utf-8"?>
+<p:sld xmlns:a="http://schemas.openxmlformats.org/drawingml/2006/main" xmlns:r="http://schemas.openxmlformats.org/officeDocument/2006/relationships" xmlns:p="http://schemas.openxmlformats.org/presentationml/2006/main">
+  <p:cSld>
+    <p:spTree>
+      <p:nvGrpSpPr>
+        <p:cNvPr id="1" name=""/>
+        <p:cNvGrpSpPr/>
+        <p:nvPr/>
+      </p:nvGrpSpPr>
+      <p:grpSpPr>
+        <a:xfrm>
+          <a:off x="0" y="0"/>
+          <a:ext cx="0" cy="0"/>
+          <a:chOff x="0" y="0"/>
+          <a:chExt cx="0" cy="0"/>
+        </a:xfrm>
+      </p:grpSpPr>
+      <p:sp>
+        <p:nvSpPr>
+          <p:cNvPr id="2" name="Title 1"/>
+          <p:cNvSpPr>
+            <a:spLocks noGrp="1"/>
+          </p:cNvSpPr>
+          <p:nvPr>
+            <p:ph type="title"/>
+          </p:nvPr>
+        </p:nvSpPr>
+        <p:spPr/>
+        <p:txBody>
+          <a:bodyPr/>
+          <a:lstStyle/>
+          <a:p>
+            <a:pPr lvl="0"/>
+            <a:r>
+              <a:rPr lang="en-US" dirty="0" smtClean="0"/>
+              <a:t>Small (Tablets)</a:t>
+            </a:r>
+            <a:endParaRPr lang="en-US" dirty="0"/>
+          </a:p>
+        </p:txBody>
+      </p:sp>
+      <p:sp>
+        <p:nvSpPr>
+          <p:cNvPr id="3" name="Content Placeholder 2"/>
+          <p:cNvSpPr>
+            <a:spLocks noGrp="1"/>
+          </p:cNvSpPr>
+          <p:nvPr>
+            <p:ph idx="1"/>
+          </p:nvPr>
+        </p:nvSpPr>
+        <p:spPr>
+          <a:xfrm>
+            <a:off x="457200" y="1600201"/>
+            <a:ext cx="3912975" cy="3759210"/>
+          </a:xfrm>
+        </p:spPr>
+        <p:txBody>
+          <a:bodyPr>
+            <a:normAutofit fontScale="70000" lnSpcReduction="20000"/>
+          </a:bodyPr>
+          <a:lstStyle/>
+          <a:p>
+            <a:pPr marL="0" indent="0">
+              <a:buNone/>
+            </a:pPr>
+            <a:r>
+              <a:rPr lang="en-US" dirty="0"/>
+              <a:t>&lt;div class="col-sm-5  col-xs-12"&gt;</a:t>
+            </a:r>
+          </a:p>
+          <a:p>
+            <a:pPr marL="0" indent="0">
+              <a:buNone/>
+            </a:pPr>
+            <a:r>
+              <a:rPr lang="en-US" dirty="0"/>
+              <a:t> ...</a:t>
+            </a:r>
+          </a:p>
+          <a:p>
+            <a:pPr marL="0" indent="0">
+              <a:buNone/>
+            </a:pPr>
+            <a:r>
+              <a:rPr lang="en-US" dirty="0"/>
+              <a:t>&lt;/div&gt;</a:t>
+            </a:r>
+          </a:p>
+          <a:p>
+            <a:pPr marL="0" indent="0">
+              <a:buNone/>
+            </a:pPr>
+            <a:endParaRPr lang="en-US" dirty="0"/>
+          </a:p>
+          <a:p>
+            <a:pPr marL="0" indent="0">
+              <a:buNone/>
+            </a:pPr>
+            <a:r>
+              <a:rPr lang="en-US" dirty="0"/>
+              <a:t>&lt;div class="col-sm-2 col-xs-12"&gt;</a:t>
+            </a:r>
+          </a:p>
+          <a:p>
+            <a:pPr marL="0" indent="0">
+              <a:buNone/>
+            </a:pPr>
+            <a:r>
+              <a:rPr lang="en-US" dirty="0"/>
+              <a:t> ...</a:t>
+            </a:r>
+          </a:p>
+          <a:p>
+            <a:pPr marL="0" indent="0">
+              <a:buNone/>
+            </a:pPr>
+            <a:r>
+              <a:rPr lang="en-US" dirty="0"/>
+              <a:t>&lt;/div&gt;</a:t>
+            </a:r>
+          </a:p>
+          <a:p>
+            <a:pPr marL="0" indent="0">
+              <a:buNone/>
+            </a:pPr>
+            <a:endParaRPr lang="en-US" dirty="0"/>
+          </a:p>
+          <a:p>
+            <a:pPr marL="0" indent="0">
+              <a:buNone/>
+            </a:pPr>
+            <a:r>
+              <a:rPr lang="en-US" dirty="0"/>
+              <a:t>&lt;div class="col-sm-5 col-xs-12"&gt;</a:t>
+            </a:r>
+          </a:p>
+          <a:p>
+            <a:pPr marL="0" indent="0">
+              <a:buNone/>
+            </a:pPr>
+            <a:r>
+              <a:rPr lang="en-US" dirty="0"/>
+              <a:t> ...</a:t>
+            </a:r>
+          </a:p>
+          <a:p>
+            <a:pPr marL="0" indent="0">
+              <a:buNone/>
+            </a:pPr>
+            <a:r>
+              <a:rPr lang="en-US" dirty="0"/>
+              <a:t>&lt;/div</a:t>
+            </a:r>
+            <a:r>
+              <a:rPr lang="en-US" dirty="0" smtClean="0"/>
+              <a:t>&gt;</a:t>
+            </a:r>
+          </a:p>
+        </p:txBody>
+      </p:sp>
+      <p:pic>
+        <p:nvPicPr>
+          <p:cNvPr id="4" name="Picture 3" descr="Screen Shot 2015-05-03 at 10.19.47 PM.png"/>
+          <p:cNvPicPr>
+            <a:picLocks noChangeAspect="1"/>
+          </p:cNvPicPr>
+          <p:nvPr/>
+        </p:nvPicPr>
+        <p:blipFill>
+          <a:blip r:embed="rId2">
+            <a:extLst>
+              <a:ext uri="{28A0092B-C50C-407E-A947-70E740481C1C}">
+                <a14:useLocalDpi xmlns:a14="http://schemas.microsoft.com/office/drawing/2010/main" val="0"/>
+              </a:ext>
+            </a:extLst>
+          </a:blip>
+          <a:stretch>
+            <a:fillRect/>
+          </a:stretch>
+        </p:blipFill>
+        <p:spPr>
+          <a:xfrm>
+            <a:off x="4499751" y="1600829"/>
+            <a:ext cx="4187049" cy="3758582"/>
+          </a:xfrm>
+          <a:prstGeom prst="rect">
+            <a:avLst/>
+          </a:prstGeom>
+        </p:spPr>
+      </p:pic>
+    </p:spTree>
+    <p:extLst>
+      <p:ext uri="{BB962C8B-B14F-4D97-AF65-F5344CB8AC3E}">
+        <p14:creationId xmlns:p14="http://schemas.microsoft.com/office/powerpoint/2010/main" val="2448083814"/>
+      </p:ext>
+    </p:extLst>
+  </p:cSld>
+  <p:clrMapOvr>
+    <a:masterClrMapping/>
+  </p:clrMapOvr>
+  <p:timing>
+    <p:tnLst>
+      <p:par>
+        <p:cTn xmlns:p14="http://schemas.microsoft.com/office/powerpoint/2010/main" id="1" dur="indefinite" restart="never" nodeType="tmRoot"/>
+      </p:par>
+    </p:tnLst>
+  </p:timing>
+</p:sld>
+</file>
+
+<file path=ppt/slides/slide5.xml><?xml version="1.0" encoding="utf-8"?>
+<p:sld xmlns:a="http://schemas.openxmlformats.org/drawingml/2006/main" xmlns:r="http://schemas.openxmlformats.org/officeDocument/2006/relationships" xmlns:p="http://schemas.openxmlformats.org/presentationml/2006/main">
+  <p:cSld>
+    <p:spTree>
+      <p:nvGrpSpPr>
+        <p:cNvPr id="1" name=""/>
+        <p:cNvGrpSpPr/>
+        <p:nvPr/>
+      </p:nvGrpSpPr>
+      <p:grpSpPr>
+        <a:xfrm>
+          <a:off x="0" y="0"/>
+          <a:ext cx="0" cy="0"/>
+          <a:chOff x="0" y="0"/>
+          <a:chExt cx="0" cy="0"/>
+        </a:xfrm>
+      </p:grpSpPr>
+      <p:sp>
+        <p:nvSpPr>
+          <p:cNvPr id="2" name="Title 1"/>
+          <p:cNvSpPr>
+            <a:spLocks noGrp="1"/>
+          </p:cNvSpPr>
+          <p:nvPr>
+            <p:ph type="title"/>
+          </p:nvPr>
+        </p:nvSpPr>
+        <p:spPr/>
+        <p:txBody>
+          <a:bodyPr/>
+          <a:lstStyle/>
+          <a:p>
+            <a:r>
+              <a:rPr lang="en-US" dirty="0" smtClean="0"/>
+              <a:t>Medium (Desktop)</a:t>
+            </a:r>
+            <a:endParaRPr lang="en-US" dirty="0"/>
+          </a:p>
+        </p:txBody>
+      </p:sp>
+      <p:sp>
+        <p:nvSpPr>
+          <p:cNvPr id="3" name="Content Placeholder 2"/>
+          <p:cNvSpPr>
+            <a:spLocks noGrp="1"/>
+          </p:cNvSpPr>
+          <p:nvPr>
+            <p:ph idx="1"/>
+          </p:nvPr>
+        </p:nvSpPr>
+        <p:spPr>
+          <a:xfrm>
+            <a:off x="457200" y="1600201"/>
+            <a:ext cx="5856985" cy="3221116"/>
+          </a:xfrm>
+        </p:spPr>
+        <p:txBody>
+          <a:bodyPr>
+            <a:normAutofit fontScale="55000" lnSpcReduction="20000"/>
+          </a:bodyPr>
+          <a:lstStyle/>
+          <a:p>
+            <a:pPr marL="0" indent="0">
+              <a:buNone/>
+            </a:pPr>
+            <a:r>
+              <a:rPr lang="nl-NL" dirty="0" smtClean="0"/>
+              <a:t>&lt;div class="col-md-4 col-sm-5  col-xs-12"&gt;</a:t>
+            </a:r>
+          </a:p>
+          <a:p>
+            <a:pPr marL="0" indent="0">
+              <a:buNone/>
+            </a:pPr>
+            <a:r>
+              <a:rPr lang="nl-NL" dirty="0" smtClean="0"/>
+              <a:t> ...</a:t>
+            </a:r>
+          </a:p>
+          <a:p>
+            <a:pPr marL="0" indent="0">
+              <a:buNone/>
+            </a:pPr>
+            <a:r>
+              <a:rPr lang="nl-NL" dirty="0" smtClean="0"/>
+              <a:t>&lt;/div&gt;</a:t>
+            </a:r>
+          </a:p>
+          <a:p>
+            <a:pPr marL="0" indent="0">
+              <a:buNone/>
+            </a:pPr>
+            <a:endParaRPr lang="nl-NL" dirty="0" smtClean="0"/>
+          </a:p>
+          <a:p>
+            <a:pPr marL="0" indent="0">
+              <a:buNone/>
+            </a:pPr>
+            <a:r>
+              <a:rPr lang="nl-NL" dirty="0" smtClean="0"/>
+              <a:t>&lt;div class="col-md-4 col-sm-2 col-xs-12"&gt;</a:t>
+            </a:r>
+          </a:p>
+          <a:p>
+            <a:pPr marL="0" indent="0">
+              <a:buNone/>
+            </a:pPr>
+            <a:r>
+              <a:rPr lang="nl-NL" dirty="0" smtClean="0"/>
+              <a:t> ...</a:t>
+            </a:r>
+          </a:p>
+          <a:p>
+            <a:pPr marL="0" indent="0">
+              <a:buNone/>
+            </a:pPr>
+            <a:r>
+              <a:rPr lang="nl-NL" dirty="0" smtClean="0"/>
+              <a:t>&lt;/div&gt;</a:t>
+            </a:r>
+          </a:p>
+          <a:p>
+            <a:pPr marL="0" indent="0">
+              <a:buNone/>
+            </a:pPr>
+            <a:endParaRPr lang="nl-NL" dirty="0" smtClean="0"/>
+          </a:p>
+          <a:p>
+            <a:pPr marL="0" indent="0">
+              <a:buNone/>
+            </a:pPr>
+            <a:r>
+              <a:rPr lang="nl-NL" dirty="0" smtClean="0"/>
+              <a:t>&lt;div class="col-md-4 col-sm-5 col-xs-12"&gt;</a:t>
+            </a:r>
+          </a:p>
+          <a:p>
+            <a:pPr marL="0" indent="0">
+              <a:buNone/>
+            </a:pPr>
+            <a:r>
+              <a:rPr lang="nl-NL" dirty="0" smtClean="0"/>
+              <a:t> ...</a:t>
+            </a:r>
+          </a:p>
+          <a:p>
+            <a:pPr marL="0" indent="0">
+              <a:buNone/>
+            </a:pPr>
+            <a:r>
+              <a:rPr lang="nl-NL" dirty="0" smtClean="0"/>
+              <a:t>&lt;/div&gt;</a:t>
+            </a:r>
+          </a:p>
+        </p:txBody>
+      </p:sp>
+      <p:pic>
+        <p:nvPicPr>
+          <p:cNvPr id="4" name="Picture 3" descr="Screen Shot 2015-05-03 at 10.20.38 PM.png"/>
+          <p:cNvPicPr>
+            <a:picLocks noChangeAspect="1"/>
+          </p:cNvPicPr>
+          <p:nvPr/>
+        </p:nvPicPr>
+        <p:blipFill>
+          <a:blip r:embed="rId2">
+            <a:extLst>
+              <a:ext uri="{28A0092B-C50C-407E-A947-70E740481C1C}">
+                <a14:useLocalDpi xmlns:a14="http://schemas.microsoft.com/office/drawing/2010/main" val="0"/>
+              </a:ext>
+            </a:extLst>
+          </a:blip>
+          <a:stretch>
+            <a:fillRect/>
+          </a:stretch>
+        </p:blipFill>
+        <p:spPr>
+          <a:xfrm>
+            <a:off x="3974725" y="3615988"/>
+            <a:ext cx="4712075" cy="2817914"/>
+          </a:xfrm>
+          <a:prstGeom prst="rect">
+            <a:avLst/>
+          </a:prstGeom>
+        </p:spPr>
+      </p:pic>
+    </p:spTree>
+    <p:extLst>
+      <p:ext uri="{BB962C8B-B14F-4D97-AF65-F5344CB8AC3E}">
+        <p14:creationId xmlns:p14="http://schemas.microsoft.com/office/powerpoint/2010/main" val="2316636498"/>
+      </p:ext>
+    </p:extLst>
+  </p:cSld>
+  <p:clrMapOvr>
+    <a:masterClrMapping/>
+  </p:clrMapOvr>
+  <p:timing>
+    <p:tnLst>
+      <p:par>
+        <p:cTn xmlns:p14="http://schemas.microsoft.com/office/powerpoint/2010/main" id="1" dur="indefinite" restart="never" nodeType="tmRoot"/>
+      </p:par>
+    </p:tnLst>
+  </p:timing>
+</p:sld>
+</file>
+
+<file path=ppt/slides/slide6.xml><?xml version="1.0" encoding="utf-8"?>
+<p:sld xmlns:a="http://schemas.openxmlformats.org/drawingml/2006/main" xmlns:r="http://schemas.openxmlformats.org/officeDocument/2006/relationships" xmlns:p="http://schemas.openxmlformats.org/presentationml/2006/main">
+  <p:cSld>
+    <p:spTree>
+      <p:nvGrpSpPr>
+        <p:cNvPr id="1" name=""/>
+        <p:cNvGrpSpPr/>
+        <p:nvPr/>
+      </p:nvGrpSpPr>
+      <p:grpSpPr>
+        <a:xfrm>
+          <a:off x="0" y="0"/>
+          <a:ext cx="0" cy="0"/>
+          <a:chOff x="0" y="0"/>
+          <a:chExt cx="0" cy="0"/>
+        </a:xfrm>
+      </p:grpSpPr>
+      <p:sp>
+        <p:nvSpPr>
+          <p:cNvPr id="2" name="Title 1"/>
+          <p:cNvSpPr>
+            <a:spLocks noGrp="1"/>
+          </p:cNvSpPr>
+          <p:nvPr>
+            <p:ph type="title"/>
+          </p:nvPr>
+        </p:nvSpPr>
+        <p:spPr/>
+        <p:txBody>
+          <a:bodyPr/>
+          <a:lstStyle/>
+          <a:p>
+            <a:r>
+              <a:rPr lang="en-US" dirty="0" smtClean="0"/>
+              <a:t>Large (Big</a:t>
+            </a:r>
+            <a:r>
+              <a:rPr lang="en-US" baseline="0" dirty="0" smtClean="0"/>
+              <a:t> Monitors)</a:t>
+            </a:r>
+            <a:endParaRPr lang="en-US" dirty="0"/>
+          </a:p>
+        </p:txBody>
+      </p:sp>
+      <p:sp>
+        <p:nvSpPr>
+          <p:cNvPr id="3" name="Content Placeholder 2"/>
+          <p:cNvSpPr>
+            <a:spLocks noGrp="1"/>
+          </p:cNvSpPr>
+          <p:nvPr>
+            <p:ph idx="1"/>
+          </p:nvPr>
+        </p:nvSpPr>
+        <p:spPr>
+          <a:xfrm>
+            <a:off x="457200" y="1600200"/>
+            <a:ext cx="8229600" cy="1929693"/>
+          </a:xfrm>
+        </p:spPr>
+        <p:txBody>
+          <a:bodyPr>
+            <a:normAutofit/>
+          </a:bodyPr>
+          <a:lstStyle/>
+          <a:p>
+            <a:pPr marL="0" indent="0">
+              <a:buNone/>
+            </a:pPr>
+            <a:r>
+              <a:rPr lang="nl-NL" sz="2800" dirty="0"/>
+              <a:t>&lt;div class="col-lg-3 col-md-4 col-sm-5  col-xs-12"</a:t>
+            </a:r>
+            <a:r>
+              <a:rPr lang="nl-NL" sz="2800" dirty="0" smtClean="0"/>
+              <a:t>&gt;</a:t>
+            </a:r>
+            <a:endParaRPr lang="nl-NL" sz="2800" dirty="0"/>
+          </a:p>
+          <a:p>
+            <a:pPr marL="0" indent="0">
+              <a:buNone/>
+            </a:pPr>
+            <a:r>
+              <a:rPr lang="nl-NL" sz="2800" dirty="0"/>
+              <a:t>&lt;div class="col-lg-4 col-md-4 col-sm-2 col-xs-12"</a:t>
+            </a:r>
+            <a:r>
+              <a:rPr lang="nl-NL" sz="2800" dirty="0" smtClean="0"/>
+              <a:t>&gt;</a:t>
+            </a:r>
+            <a:endParaRPr lang="nl-NL" sz="2800" dirty="0"/>
+          </a:p>
+          <a:p>
+            <a:pPr marL="0" indent="0">
+              <a:buNone/>
+            </a:pPr>
+            <a:r>
+              <a:rPr lang="nl-NL" sz="2800" dirty="0"/>
+              <a:t>&lt;div class="col-lg-3 col-md-4 col-sm-5 col-xs-12"</a:t>
+            </a:r>
+            <a:r>
+              <a:rPr lang="nl-NL" sz="2800" dirty="0" smtClean="0"/>
+              <a:t>&gt;</a:t>
+            </a:r>
+          </a:p>
+        </p:txBody>
+      </p:sp>
+      <p:pic>
+        <p:nvPicPr>
+          <p:cNvPr id="4" name="Picture 3" descr="Screen Shot 2015-05-03 at 10.21.41 PM.png"/>
+          <p:cNvPicPr>
+            <a:picLocks noChangeAspect="1"/>
+          </p:cNvPicPr>
+          <p:nvPr/>
+        </p:nvPicPr>
+        <p:blipFill>
+          <a:blip r:embed="rId2">
+            <a:extLst>
+              <a:ext uri="{28A0092B-C50C-407E-A947-70E740481C1C}">
+                <a14:useLocalDpi xmlns:a14="http://schemas.microsoft.com/office/drawing/2010/main" val="0"/>
+              </a:ext>
+            </a:extLst>
+          </a:blip>
+          <a:stretch>
+            <a:fillRect/>
+          </a:stretch>
+        </p:blipFill>
+        <p:spPr>
+          <a:xfrm>
+            <a:off x="1485428" y="3455066"/>
+            <a:ext cx="5807167" cy="2973047"/>
+          </a:xfrm>
+          <a:prstGeom prst="rect">
+            <a:avLst/>
+          </a:prstGeom>
+        </p:spPr>
+      </p:pic>
+    </p:spTree>
+    <p:extLst>
+      <p:ext uri="{BB962C8B-B14F-4D97-AF65-F5344CB8AC3E}">
+        <p14:creationId xmlns:p14="http://schemas.microsoft.com/office/powerpoint/2010/main" val="1910705795"/>
+      </p:ext>
+    </p:extLst>
+  </p:cSld>
+  <p:clrMapOvr>
+    <a:masterClrMapping/>
+  </p:clrMapOvr>
+  <p:timing>
+    <p:tnLst>
+      <p:par>
+        <p:cTn xmlns:p14="http://schemas.microsoft.com/office/powerpoint/2010/main" id="1" dur="indefinite" restart="never" nodeType="tmRoot"/>
+      </p:par>
+    </p:tnLst>
+  </p:timing>
+</p:sld>
+</file>
+
+<file path=ppt/slides/slide7.xml><?xml version="1.0" encoding="utf-8"?>
+<p:sld xmlns:a="http://schemas.openxmlformats.org/drawingml/2006/main" xmlns:r="http://schemas.openxmlformats.org/officeDocument/2006/relationships" xmlns:p="http://schemas.openxmlformats.org/presentationml/2006/main">
+  <p:cSld>
+    <p:spTree>
+      <p:nvGrpSpPr>
+        <p:cNvPr id="1" name=""/>
+        <p:cNvGrpSpPr/>
+        <p:nvPr/>
+      </p:nvGrpSpPr>
+      <p:grpSpPr>
+        <a:xfrm>
+          <a:off x="0" y="0"/>
+          <a:ext cx="0" cy="0"/>
+          <a:chOff x="0" y="0"/>
+          <a:chExt cx="0" cy="0"/>
+        </a:xfrm>
+      </p:grpSpPr>
+      <p:sp>
+        <p:nvSpPr>
+          <p:cNvPr id="2" name="Title 1"/>
+          <p:cNvSpPr>
+            <a:spLocks noGrp="1"/>
+          </p:cNvSpPr>
+          <p:nvPr>
+            <p:ph type="title"/>
+          </p:nvPr>
+        </p:nvSpPr>
+        <p:spPr/>
+        <p:txBody>
+          <a:bodyPr/>
+          <a:lstStyle/>
+          <a:p>
+            <a:r>
+              <a:rPr lang="en-US" dirty="0" smtClean="0"/>
+              <a:t>Hide and Show</a:t>
+            </a:r>
+            <a:endParaRPr lang="en-US" dirty="0"/>
+          </a:p>
+        </p:txBody>
+      </p:sp>
+      <p:sp>
+        <p:nvSpPr>
+          <p:cNvPr id="3" name="Content Placeholder 2"/>
+          <p:cNvSpPr>
+            <a:spLocks noGrp="1"/>
+          </p:cNvSpPr>
+          <p:nvPr>
+            <p:ph idx="1"/>
+          </p:nvPr>
+        </p:nvSpPr>
+        <p:spPr/>
+        <p:txBody>
+          <a:bodyPr>
+            <a:normAutofit lnSpcReduction="10000"/>
+          </a:bodyPr>
+          <a:lstStyle/>
+          <a:p>
+            <a:pPr marL="0" indent="0">
+              <a:buNone/>
+            </a:pPr>
+            <a:r>
+              <a:rPr lang="en-US" dirty="0"/>
+              <a:t>.visible-</a:t>
+            </a:r>
+            <a:r>
+              <a:rPr lang="en-US" dirty="0" err="1"/>
+              <a:t>xs</a:t>
+            </a:r>
+            <a:r>
+              <a:rPr lang="en-US" dirty="0"/>
+              <a:t>	Extra small (less than 768px) visible</a:t>
+            </a:r>
+          </a:p>
+          <a:p>
+            <a:pPr marL="0" indent="0">
+              <a:buNone/>
+            </a:pPr>
+            <a:r>
+              <a:rPr lang="en-US" dirty="0"/>
+              <a:t>.visible-</a:t>
+            </a:r>
+            <a:r>
+              <a:rPr lang="en-US" dirty="0" err="1"/>
+              <a:t>sm</a:t>
+            </a:r>
+            <a:r>
+              <a:rPr lang="en-US" dirty="0"/>
+              <a:t>	Small (up to 768 </a:t>
+            </a:r>
+            <a:r>
+              <a:rPr lang="en-US" dirty="0" err="1"/>
+              <a:t>px</a:t>
+            </a:r>
+            <a:r>
+              <a:rPr lang="en-US" dirty="0"/>
+              <a:t>) visible</a:t>
+            </a:r>
+          </a:p>
+          <a:p>
+            <a:pPr marL="0" indent="0">
+              <a:buNone/>
+            </a:pPr>
+            <a:r>
+              <a:rPr lang="en-US" dirty="0"/>
+              <a:t>.visible-md	Medium (768 </a:t>
+            </a:r>
+            <a:r>
+              <a:rPr lang="en-US" dirty="0" err="1"/>
+              <a:t>px</a:t>
+            </a:r>
+            <a:r>
+              <a:rPr lang="en-US" dirty="0"/>
+              <a:t> to 991 </a:t>
+            </a:r>
+            <a:r>
+              <a:rPr lang="en-US" dirty="0" err="1"/>
+              <a:t>px</a:t>
+            </a:r>
+            <a:r>
+              <a:rPr lang="en-US" dirty="0"/>
+              <a:t>) visible</a:t>
+            </a:r>
+          </a:p>
+          <a:p>
+            <a:pPr marL="0" indent="0">
+              <a:buNone/>
+            </a:pPr>
+            <a:r>
+              <a:rPr lang="en-US" dirty="0"/>
+              <a:t>.visible-</a:t>
+            </a:r>
+            <a:r>
+              <a:rPr lang="en-US" dirty="0" err="1"/>
+              <a:t>lg</a:t>
+            </a:r>
+            <a:r>
+              <a:rPr lang="en-US" dirty="0"/>
+              <a:t>	Larger (992 </a:t>
+            </a:r>
+            <a:r>
+              <a:rPr lang="en-US" dirty="0" err="1"/>
+              <a:t>px</a:t>
+            </a:r>
+            <a:r>
+              <a:rPr lang="en-US" dirty="0"/>
+              <a:t> and above) visible</a:t>
+            </a:r>
+          </a:p>
+          <a:p>
+            <a:pPr marL="0" indent="0">
+              <a:buNone/>
+            </a:pPr>
+            <a:r>
+              <a:rPr lang="en-US" dirty="0"/>
+              <a:t>.hidden-</a:t>
+            </a:r>
+            <a:r>
+              <a:rPr lang="en-US" dirty="0" err="1"/>
+              <a:t>xs</a:t>
+            </a:r>
+            <a:r>
+              <a:rPr lang="en-US" dirty="0"/>
+              <a:t>	Extra small (less than 768px) hidden</a:t>
+            </a:r>
+          </a:p>
+          <a:p>
+            <a:pPr marL="0" indent="0">
+              <a:buNone/>
+            </a:pPr>
+            <a:r>
+              <a:rPr lang="en-US" dirty="0"/>
+              <a:t>.hidden-</a:t>
+            </a:r>
+            <a:r>
+              <a:rPr lang="en-US" dirty="0" err="1"/>
+              <a:t>sm</a:t>
+            </a:r>
+            <a:r>
+              <a:rPr lang="en-US" dirty="0"/>
+              <a:t>	Small (up to 768 </a:t>
+            </a:r>
+            <a:r>
+              <a:rPr lang="en-US" dirty="0" err="1"/>
+              <a:t>px</a:t>
+            </a:r>
+            <a:r>
+              <a:rPr lang="en-US" dirty="0"/>
+              <a:t>) </a:t>
+            </a:r>
+            <a:r>
+              <a:rPr lang="en-US" dirty="0" smtClean="0"/>
+              <a:t>hidden</a:t>
+            </a:r>
+            <a:endParaRPr lang="en-US" dirty="0"/>
+          </a:p>
+          <a:p>
+            <a:pPr marL="0" indent="0">
+              <a:buNone/>
+            </a:pPr>
+            <a:r>
+              <a:rPr lang="en-US" dirty="0" smtClean="0"/>
+              <a:t>.hidden-md	Medium (768 </a:t>
+            </a:r>
+            <a:r>
+              <a:rPr lang="en-US" dirty="0" err="1" smtClean="0"/>
+              <a:t>px</a:t>
+            </a:r>
+            <a:r>
+              <a:rPr lang="en-US" dirty="0" smtClean="0"/>
+              <a:t> to 991 </a:t>
+            </a:r>
+            <a:r>
+              <a:rPr lang="en-US" dirty="0" err="1" smtClean="0"/>
+              <a:t>px</a:t>
+            </a:r>
+            <a:r>
+              <a:rPr lang="en-US" dirty="0" smtClean="0"/>
+              <a:t>) hidden</a:t>
+            </a:r>
+          </a:p>
+          <a:p>
+            <a:pPr marL="0" indent="0">
+              <a:buNone/>
+            </a:pPr>
+            <a:r>
+              <a:rPr lang="en-US" dirty="0" smtClean="0"/>
+              <a:t>.hidden-</a:t>
+            </a:r>
+            <a:r>
+              <a:rPr lang="en-US" dirty="0" err="1" smtClean="0"/>
+              <a:t>lg</a:t>
+            </a:r>
+            <a:r>
+              <a:rPr lang="en-US" dirty="0" smtClean="0"/>
+              <a:t>	Larger (992 </a:t>
+            </a:r>
+            <a:r>
+              <a:rPr lang="en-US" dirty="0" err="1" smtClean="0"/>
+              <a:t>px</a:t>
+            </a:r>
+            <a:r>
+              <a:rPr lang="en-US" dirty="0" smtClean="0"/>
+              <a:t> and above) hidden</a:t>
+            </a:r>
+          </a:p>
+        </p:txBody>
+      </p:sp>
+    </p:spTree>
+    <p:extLst>
+      <p:ext uri="{BB962C8B-B14F-4D97-AF65-F5344CB8AC3E}">
+        <p14:creationId xmlns:p14="http://schemas.microsoft.com/office/powerpoint/2010/main" val="1981807256"/>
+      </p:ext>
+    </p:extLst>
+  </p:cSld>
+  <p:clrMapOvr>
+    <a:masterClrMapping/>
+  </p:clrMapOvr>
+  <p:timing>
+    <p:tnLst>
+      <p:par>
+        <p:cTn xmlns:p14="http://schemas.microsoft.com/office/powerpoint/2010/main" id="1" dur="indefinite" restart="never" nodeType="tmRoot"/>
+      </p:par>
+    </p:tnLst>
+  </p:timing>
+</p:sld>
+</file>
+
+<file path=ppt/slides/slide8.xml><?xml version="1.0" encoding="utf-8"?>
+<p:sld xmlns:a="http://schemas.openxmlformats.org/drawingml/2006/main" xmlns:r="http://schemas.openxmlformats.org/officeDocument/2006/relationships" xmlns:p="http://schemas.openxmlformats.org/presentationml/2006/main">
+  <p:cSld>
+    <p:spTree>
+      <p:nvGrpSpPr>
+        <p:cNvPr id="1" name=""/>
+        <p:cNvGrpSpPr/>
+        <p:nvPr/>
+      </p:nvGrpSpPr>
+      <p:grpSpPr>
+        <a:xfrm>
+          <a:off x="0" y="0"/>
+          <a:ext cx="0" cy="0"/>
+          <a:chOff x="0" y="0"/>
+          <a:chExt cx="0" cy="0"/>
+        </a:xfrm>
+      </p:grpSpPr>
+      <p:sp>
+        <p:nvSpPr>
+          <p:cNvPr id="2" name="Title 1"/>
+          <p:cNvSpPr>
+            <a:spLocks noGrp="1"/>
+          </p:cNvSpPr>
+          <p:nvPr>
+            <p:ph type="title"/>
+          </p:nvPr>
+        </p:nvSpPr>
+        <p:spPr/>
+        <p:txBody>
+          <a:bodyPr/>
+          <a:lstStyle/>
+          <a:p>
+            <a:r>
+              <a:rPr lang="en-US" dirty="0" smtClean="0"/>
+              <a:t>More</a:t>
+            </a:r>
+            <a:r>
+              <a:rPr lang="en-US" baseline="0" dirty="0" smtClean="0"/>
+              <a:t> Info</a:t>
+            </a:r>
+            <a:endParaRPr lang="en-US" dirty="0"/>
+          </a:p>
+        </p:txBody>
+      </p:sp>
+      <p:sp>
+        <p:nvSpPr>
+          <p:cNvPr id="3" name="Content Placeholder 2"/>
+          <p:cNvSpPr>
+            <a:spLocks noGrp="1"/>
+          </p:cNvSpPr>
+          <p:nvPr>
+            <p:ph idx="1"/>
+          </p:nvPr>
+        </p:nvSpPr>
+        <p:spPr/>
+        <p:txBody>
+          <a:bodyPr>
+            <a:normAutofit fontScale="85000" lnSpcReduction="20000"/>
+          </a:bodyPr>
+          <a:lstStyle/>
+          <a:p>
+            <a:r>
+              <a:rPr lang="en-US" dirty="0" smtClean="0"/>
+              <a:t>Bootstrap:</a:t>
+            </a:r>
+          </a:p>
+          <a:p>
+            <a:pPr lvl="1"/>
+            <a:r>
+              <a:rPr lang="en-US" dirty="0" smtClean="0"/>
+              <a:t>http</a:t>
+            </a:r>
+            <a:r>
+              <a:rPr lang="en-US" dirty="0"/>
+              <a:t>://</a:t>
+            </a:r>
+            <a:r>
+              <a:rPr lang="en-US" dirty="0" err="1"/>
+              <a:t>getbootstrap.com</a:t>
+            </a:r>
+            <a:r>
+              <a:rPr lang="en-US" dirty="0"/>
+              <a:t>/</a:t>
+            </a:r>
+            <a:r>
+              <a:rPr lang="en-US" dirty="0" err="1"/>
+              <a:t>css</a:t>
+            </a:r>
+            <a:r>
+              <a:rPr lang="en-US" dirty="0"/>
+              <a:t>/#</a:t>
+            </a:r>
+            <a:r>
+              <a:rPr lang="en-US" dirty="0" smtClean="0"/>
+              <a:t>grid</a:t>
+            </a:r>
+          </a:p>
+          <a:p>
+            <a:r>
+              <a:rPr lang="en-US" dirty="0" smtClean="0"/>
+              <a:t>W3 Schools</a:t>
+            </a:r>
+          </a:p>
+          <a:p>
+            <a:pPr lvl="1"/>
+            <a:r>
+              <a:rPr lang="en-US" dirty="0" smtClean="0"/>
+              <a:t>http</a:t>
+            </a:r>
+            <a:r>
+              <a:rPr lang="en-US" dirty="0"/>
+              <a:t>://www.w3schools.com/bootstrap/</a:t>
+            </a:r>
+            <a:r>
+              <a:rPr lang="en-US" dirty="0" err="1"/>
+              <a:t>bootstrap_grid_basic.asp</a:t>
+            </a:r>
+            <a:endParaRPr lang="en-US" dirty="0"/>
+          </a:p>
+          <a:p>
+            <a:r>
+              <a:rPr lang="en-US" dirty="0" smtClean="0"/>
+              <a:t>Tutorials Point</a:t>
+            </a:r>
+          </a:p>
+          <a:p>
+            <a:pPr lvl="1"/>
+            <a:r>
+              <a:rPr lang="en-US" dirty="0" smtClean="0"/>
+              <a:t>http://</a:t>
+            </a:r>
+            <a:r>
+              <a:rPr lang="en-US" dirty="0" err="1" smtClean="0"/>
+              <a:t>www.tutorialspoint.com</a:t>
+            </a:r>
+            <a:r>
+              <a:rPr lang="en-US" dirty="0" smtClean="0"/>
+              <a:t>/bootstrap/</a:t>
+            </a:r>
+            <a:r>
+              <a:rPr lang="en-US" dirty="0" err="1" smtClean="0"/>
+              <a:t>bootstrap_grid_system.htm</a:t>
+            </a:r>
+            <a:endParaRPr lang="en-US" dirty="0" smtClean="0"/>
+          </a:p>
+          <a:p>
+            <a:r>
+              <a:rPr lang="en-US" dirty="0" smtClean="0"/>
+              <a:t>Code Academy</a:t>
+            </a:r>
+          </a:p>
+          <a:p>
+            <a:pPr lvl="1"/>
+            <a:r>
+              <a:rPr lang="en-US" dirty="0"/>
+              <a:t>http://</a:t>
+            </a:r>
+            <a:r>
+              <a:rPr lang="en-US" dirty="0" err="1"/>
+              <a:t>www.codecademy.com</a:t>
+            </a:r>
+            <a:r>
+              <a:rPr lang="en-US" dirty="0"/>
+              <a:t>/courses/web-beginner-en-</a:t>
+            </a:r>
+            <a:r>
+              <a:rPr lang="en-US" dirty="0" err="1"/>
+              <a:t>yjvdd</a:t>
+            </a:r>
+            <a:r>
+              <a:rPr lang="en-US" dirty="0"/>
+              <a:t>/0/5?content_from=make-a-website%3Abootstrap-components</a:t>
+            </a:r>
+            <a:endParaRPr lang="en-US" dirty="0" smtClean="0"/>
+          </a:p>
+          <a:p>
+            <a:endParaRPr lang="en-US" dirty="0"/>
+          </a:p>
+        </p:txBody>
+      </p:sp>
+    </p:spTree>
+    <p:extLst>
+      <p:ext uri="{BB962C8B-B14F-4D97-AF65-F5344CB8AC3E}">
+        <p14:creationId xmlns:p14="http://schemas.microsoft.com/office/powerpoint/2010/main" val="2477400445"/>
       </p:ext>
     </p:extLst>
   </p:cSld>

</xml_diff>